<commit_message>
Updated presentation to include refactoring and such
</commit_message>
<xml_diff>
--- a/Presentation 5/Presentation.pptx
+++ b/Presentation 5/Presentation.pptx
@@ -4319,10 +4319,10 @@
       </p:sp>
       <p:sp>
         <p:nvSpPr>
-          <p:cNvPr id="3" name="Content Placeholder 2">
+          <p:cNvPr id="7" name="Content Placeholder 6">
             <a:extLst>
               <a:ext uri="{FF2B5EF4-FFF2-40B4-BE49-F238E27FC236}">
-                <a16:creationId xmlns:a16="http://schemas.microsoft.com/office/drawing/2014/main" id="{3EE5EF92-30AE-49B2-824F-DF5C9D56E242}"/>
+                <a16:creationId xmlns:a16="http://schemas.microsoft.com/office/drawing/2014/main" id="{29B06102-522B-421B-A1CB-15574D84486B}"/>
               </a:ext>
             </a:extLst>
           </p:cNvPr>
@@ -4338,7 +4338,74 @@
           <a:bodyPr/>
           <a:lstStyle/>
           <a:p>
-            <a:endParaRPr lang="en-US"/>
+            <a:r>
+              <a:rPr lang="en-US" dirty="0"/>
+              <a:t>Separated classes into MVC layout</a:t>
+            </a:r>
+          </a:p>
+          <a:p>
+            <a:pPr lvl="1"/>
+            <a:r>
+              <a:rPr lang="en-US" dirty="0"/>
+              <a:t>Model contains all game logic</a:t>
+            </a:r>
+          </a:p>
+          <a:p>
+            <a:pPr lvl="1"/>
+            <a:r>
+              <a:rPr lang="en-US" dirty="0"/>
+              <a:t>View contain UI elements</a:t>
+            </a:r>
+          </a:p>
+          <a:p>
+            <a:pPr lvl="1"/>
+            <a:r>
+              <a:rPr lang="en-US" dirty="0"/>
+              <a:t>Controller helps with server and database interaction</a:t>
+            </a:r>
+          </a:p>
+          <a:p>
+            <a:r>
+              <a:rPr lang="en-US" dirty="0"/>
+              <a:t>Implemented Façade Pattern</a:t>
+            </a:r>
+          </a:p>
+          <a:p>
+            <a:pPr lvl="1"/>
+            <a:r>
+              <a:rPr lang="en-US" dirty="0"/>
+              <a:t>Mainly within </a:t>
+            </a:r>
+            <a:r>
+              <a:rPr lang="en-US"/>
+              <a:t>Model package</a:t>
+            </a:r>
+            <a:endParaRPr lang="en-US" dirty="0"/>
+          </a:p>
+          <a:p>
+            <a:r>
+              <a:rPr lang="en-US" dirty="0"/>
+              <a:t>Extraction of Code</a:t>
+            </a:r>
+          </a:p>
+          <a:p>
+            <a:r>
+              <a:rPr lang="en-US" dirty="0"/>
+              <a:t>Rearranged class structure to reduce coupling</a:t>
+            </a:r>
+          </a:p>
+          <a:p>
+            <a:r>
+              <a:rPr lang="en-US" dirty="0"/>
+              <a:t>Removed unneeded/unused classes</a:t>
+            </a:r>
+          </a:p>
+          <a:p>
+            <a:pPr lvl="1"/>
+            <a:r>
+              <a:rPr lang="en-US" dirty="0"/>
+              <a:t>Log, Profile, Invitation</a:t>
+            </a:r>
           </a:p>
         </p:txBody>
       </p:sp>

</xml_diff>

<commit_message>
last update to slides
</commit_message>
<xml_diff>
--- a/Presentation 5/Presentation.pptx
+++ b/Presentation 5/Presentation.pptx
@@ -6,9 +6,9 @@
   </p:sldMasterIdLst>
   <p:sldIdLst>
     <p:sldId id="256" r:id="rId2"/>
-    <p:sldId id="257" r:id="rId3"/>
-    <p:sldId id="258" r:id="rId4"/>
-    <p:sldId id="259" r:id="rId5"/>
+    <p:sldId id="259" r:id="rId3"/>
+    <p:sldId id="257" r:id="rId4"/>
+    <p:sldId id="258" r:id="rId5"/>
     <p:sldId id="261" r:id="rId6"/>
     <p:sldId id="262" r:id="rId7"/>
     <p:sldId id="264" r:id="rId8"/>
@@ -3836,38 +3836,29 @@
           <a:lstStyle/>
           <a:p>
             <a:r>
-              <a:rPr lang="en-US" dirty="0" smtClean="0"/>
+              <a:rPr lang="en-US" dirty="0"/>
               <a:t>Design Document,</a:t>
             </a:r>
             <a:br>
-              <a:rPr lang="en-US" dirty="0" smtClean="0"/>
+              <a:rPr lang="en-US" dirty="0"/>
             </a:br>
-            <a:r>
-              <a:rPr lang="en-US" dirty="0"/>
-              <a:t/>
-            </a:r>
             <a:br>
               <a:rPr lang="en-US" dirty="0"/>
             </a:br>
             <a:r>
-              <a:rPr lang="en-US" dirty="0" smtClean="0"/>
+              <a:rPr lang="en-US" dirty="0"/>
               <a:t>Part 2,</a:t>
             </a:r>
             <a:br>
-              <a:rPr lang="en-US" dirty="0" smtClean="0"/>
+              <a:rPr lang="en-US" dirty="0"/>
             </a:br>
-            <a:r>
-              <a:rPr lang="en-US" dirty="0"/>
-              <a:t/>
-            </a:r>
             <a:br>
               <a:rPr lang="en-US" dirty="0"/>
             </a:br>
             <a:r>
-              <a:rPr lang="en-US" dirty="0" smtClean="0"/>
+              <a:rPr lang="en-US" dirty="0"/>
               <a:t>Design Class Diagram</a:t>
             </a:r>
-            <a:endParaRPr lang="en-US" dirty="0"/>
           </a:p>
         </p:txBody>
       </p:sp>
@@ -3971,38 +3962,29 @@
           <a:lstStyle/>
           <a:p>
             <a:r>
-              <a:rPr lang="en-US" dirty="0" smtClean="0"/>
+              <a:rPr lang="en-US" dirty="0"/>
               <a:t>Design Document,</a:t>
             </a:r>
             <a:br>
-              <a:rPr lang="en-US" dirty="0" smtClean="0"/>
+              <a:rPr lang="en-US" dirty="0"/>
             </a:br>
-            <a:r>
-              <a:rPr lang="en-US" dirty="0"/>
-              <a:t/>
-            </a:r>
             <a:br>
               <a:rPr lang="en-US" dirty="0"/>
             </a:br>
             <a:r>
-              <a:rPr lang="en-US" dirty="0" smtClean="0"/>
+              <a:rPr lang="en-US" dirty="0"/>
               <a:t>Part 2,</a:t>
             </a:r>
             <a:br>
-              <a:rPr lang="en-US" dirty="0" smtClean="0"/>
+              <a:rPr lang="en-US" dirty="0"/>
             </a:br>
-            <a:r>
-              <a:rPr lang="en-US" dirty="0"/>
-              <a:t/>
-            </a:r>
             <a:br>
               <a:rPr lang="en-US" dirty="0"/>
             </a:br>
             <a:r>
-              <a:rPr lang="en-US" dirty="0" smtClean="0"/>
+              <a:rPr lang="en-US" dirty="0"/>
               <a:t>Design Class Diagram</a:t>
             </a:r>
-            <a:endParaRPr lang="en-US" dirty="0"/>
           </a:p>
         </p:txBody>
       </p:sp>
@@ -4106,38 +4088,29 @@
           <a:lstStyle/>
           <a:p>
             <a:r>
-              <a:rPr lang="en-US" dirty="0" smtClean="0"/>
+              <a:rPr lang="en-US" dirty="0"/>
               <a:t>Design Document,</a:t>
             </a:r>
             <a:br>
-              <a:rPr lang="en-US" dirty="0" smtClean="0"/>
+              <a:rPr lang="en-US" dirty="0"/>
             </a:br>
-            <a:r>
-              <a:rPr lang="en-US" dirty="0"/>
-              <a:t/>
-            </a:r>
             <a:br>
               <a:rPr lang="en-US" dirty="0"/>
             </a:br>
             <a:r>
-              <a:rPr lang="en-US" dirty="0" smtClean="0"/>
+              <a:rPr lang="en-US" dirty="0"/>
               <a:t>Part 2,</a:t>
             </a:r>
             <a:br>
-              <a:rPr lang="en-US" dirty="0" smtClean="0"/>
+              <a:rPr lang="en-US" dirty="0"/>
             </a:br>
-            <a:r>
-              <a:rPr lang="en-US" dirty="0"/>
-              <a:t/>
-            </a:r>
             <a:br>
               <a:rPr lang="en-US" dirty="0"/>
             </a:br>
             <a:r>
-              <a:rPr lang="en-US" dirty="0" smtClean="0"/>
+              <a:rPr lang="en-US" dirty="0"/>
               <a:t>Design Class Diagram</a:t>
             </a:r>
-            <a:endParaRPr lang="en-US" dirty="0"/>
           </a:p>
         </p:txBody>
       </p:sp>
@@ -4253,10 +4226,6 @@
             <a:br>
               <a:rPr lang="en-US" dirty="0"/>
             </a:br>
-            <a:r>
-              <a:rPr lang="en-US" dirty="0"/>
-              <a:t/>
-            </a:r>
             <a:br>
               <a:rPr lang="en-US" dirty="0"/>
             </a:br>
@@ -4267,10 +4236,6 @@
             <a:br>
               <a:rPr lang="en-US" dirty="0"/>
             </a:br>
-            <a:r>
-              <a:rPr lang="en-US" dirty="0"/>
-              <a:t/>
-            </a:r>
             <a:br>
               <a:rPr lang="en-US" dirty="0"/>
             </a:br>
@@ -4369,10 +4334,6 @@
             <a:br>
               <a:rPr lang="en-US" dirty="0"/>
             </a:br>
-            <a:r>
-              <a:rPr lang="en-US" dirty="0"/>
-              <a:t/>
-            </a:r>
             <a:br>
               <a:rPr lang="en-US" dirty="0"/>
             </a:br>
@@ -4383,10 +4344,6 @@
             <a:br>
               <a:rPr lang="en-US" dirty="0"/>
             </a:br>
-            <a:r>
-              <a:rPr lang="en-US" dirty="0"/>
-              <a:t/>
-            </a:r>
             <a:br>
               <a:rPr lang="en-US" dirty="0"/>
             </a:br>
@@ -4485,10 +4442,6 @@
             <a:br>
               <a:rPr lang="en-US" dirty="0"/>
             </a:br>
-            <a:r>
-              <a:rPr lang="en-US" dirty="0"/>
-              <a:t/>
-            </a:r>
             <a:br>
               <a:rPr lang="en-US" dirty="0"/>
             </a:br>
@@ -4499,20 +4452,12 @@
             <a:br>
               <a:rPr lang="en-US" dirty="0"/>
             </a:br>
-            <a:r>
-              <a:rPr lang="en-US" dirty="0"/>
-              <a:t/>
-            </a:r>
             <a:br>
               <a:rPr lang="en-US" dirty="0"/>
             </a:br>
             <a:r>
               <a:rPr lang="en-US" i="1" dirty="0"/>
-              <a:t>Sequence Diagram </a:t>
-            </a:r>
-            <a:r>
-              <a:rPr lang="en-US" i="1" dirty="0" smtClean="0"/>
-              <a:t>3.1</a:t>
+              <a:t>Sequence Diagram 3.1</a:t>
             </a:r>
             <a:endParaRPr lang="en-US" dirty="0"/>
           </a:p>
@@ -4605,10 +4550,6 @@
             <a:br>
               <a:rPr lang="en-US" dirty="0"/>
             </a:br>
-            <a:r>
-              <a:rPr lang="en-US" dirty="0"/>
-              <a:t/>
-            </a:r>
             <a:br>
               <a:rPr lang="en-US" dirty="0"/>
             </a:br>
@@ -4619,20 +4560,12 @@
             <a:br>
               <a:rPr lang="en-US" dirty="0"/>
             </a:br>
-            <a:r>
-              <a:rPr lang="en-US" dirty="0"/>
-              <a:t/>
-            </a:r>
             <a:br>
               <a:rPr lang="en-US" dirty="0"/>
             </a:br>
             <a:r>
               <a:rPr lang="en-US" i="1" dirty="0"/>
-              <a:t>Sequence Diagram </a:t>
-            </a:r>
-            <a:r>
-              <a:rPr lang="en-US" i="1" dirty="0" smtClean="0"/>
-              <a:t>3.2</a:t>
+              <a:t>Sequence Diagram 3.2</a:t>
             </a:r>
             <a:endParaRPr lang="en-US" dirty="0"/>
           </a:p>
@@ -5663,10 +5596,9 @@
           <a:lstStyle/>
           <a:p>
             <a:r>
-              <a:rPr lang="en-US" dirty="0" smtClean="0"/>
+              <a:rPr lang="en-US" dirty="0"/>
               <a:t>Testing Document</a:t>
             </a:r>
-            <a:endParaRPr lang="en-US" dirty="0"/>
           </a:p>
         </p:txBody>
       </p:sp>
@@ -6411,10 +6343,9 @@
           <a:lstStyle/>
           <a:p>
             <a:r>
-              <a:rPr lang="en-US" dirty="0" smtClean="0"/>
+              <a:rPr lang="en-US" dirty="0"/>
               <a:t>Testing Document</a:t>
             </a:r>
-            <a:endParaRPr lang="en-US" dirty="0"/>
           </a:p>
         </p:txBody>
       </p:sp>
@@ -7189,7 +7120,7 @@
           <p:cNvPr id="2" name="Title 1">
             <a:extLst>
               <a:ext uri="{FF2B5EF4-FFF2-40B4-BE49-F238E27FC236}">
-                <a16:creationId xmlns:a16="http://schemas.microsoft.com/office/drawing/2014/main" id="{06231EB0-5BC6-45C3-8E06-97320A05BEC2}"/>
+                <a16:creationId xmlns:a16="http://schemas.microsoft.com/office/drawing/2014/main" id="{7089F230-807D-42B9-86FD-FC73B5CDC0B9}"/>
               </a:ext>
             </a:extLst>
           </p:cNvPr>
@@ -7207,7 +7138,7 @@
           <a:p>
             <a:r>
               <a:rPr lang="en-US" dirty="0"/>
-              <a:t>How did we work?</a:t>
+              <a:t>Banqi</a:t>
             </a:r>
           </a:p>
         </p:txBody>
@@ -7217,7 +7148,7 @@
           <p:cNvPr id="3" name="Content Placeholder 2">
             <a:extLst>
               <a:ext uri="{FF2B5EF4-FFF2-40B4-BE49-F238E27FC236}">
-                <a16:creationId xmlns:a16="http://schemas.microsoft.com/office/drawing/2014/main" id="{19A53038-B50A-4D2E-90CB-EC0A7B2E6576}"/>
+                <a16:creationId xmlns:a16="http://schemas.microsoft.com/office/drawing/2014/main" id="{375C385B-8D63-4668-A8C5-F7321A65FF93}"/>
               </a:ext>
             </a:extLst>
           </p:cNvPr>
@@ -7228,46 +7159,81 @@
             <p:ph idx="1"/>
           </p:nvPr>
         </p:nvSpPr>
-        <p:spPr/>
+        <p:spPr>
+          <a:xfrm>
+            <a:off x="3869268" y="246647"/>
+            <a:ext cx="7315200" cy="1975345"/>
+          </a:xfrm>
+        </p:spPr>
         <p:txBody>
-          <a:bodyPr>
-            <a:normAutofit/>
-          </a:bodyPr>
+          <a:bodyPr/>
           <a:lstStyle/>
           <a:p>
             <a:r>
-              <a:rPr lang="en-US" sz="3200" dirty="0"/>
-              <a:t>We had regular weekly meetings.</a:t>
+              <a:rPr lang="en-US" dirty="0"/>
+              <a:t>Description of Banqi</a:t>
             </a:r>
           </a:p>
           <a:p>
             <a:pPr lvl="1"/>
             <a:r>
-              <a:rPr lang="en-US" sz="3000" dirty="0"/>
-              <a:t>Usually on Sundays.</a:t>
-            </a:r>
-          </a:p>
-          <a:p>
-            <a:r>
-              <a:rPr lang="en-US" sz="3200" dirty="0"/>
-              <a:t>We communicated consistently, mostly via text.</a:t>
-            </a:r>
-          </a:p>
-          <a:p>
-            <a:r>
-              <a:rPr lang="en-US" sz="3200" dirty="0"/>
-              <a:t>We broke up work to be done as Issues on GitHub.</a:t>
-            </a:r>
-          </a:p>
-          <a:p>
-            <a:endParaRPr lang="en-US" sz="3200" dirty="0"/>
+              <a:rPr lang="en-US" dirty="0"/>
+              <a:t>Half/Blind Chinese Chess – game consists of tokens with various power levels, each placed face-down on the board in a random position. Tokens must be flipped face up (revealing color/power level) before you can move them – higher power level tokens can take lower power level tokens. Soldier can take General, General cannot take Soldier, Cannon can take anything (by jumping).</a:t>
+            </a:r>
           </a:p>
         </p:txBody>
       </p:sp>
+      <p:pic>
+        <p:nvPicPr>
+          <p:cNvPr id="1028" name="Picture 4" descr="Image result for banqi">
+            <a:extLst>
+              <a:ext uri="{FF2B5EF4-FFF2-40B4-BE49-F238E27FC236}">
+                <a16:creationId xmlns:a16="http://schemas.microsoft.com/office/drawing/2014/main" id="{37223C20-ED66-405B-906C-E8592E416393}"/>
+              </a:ext>
+            </a:extLst>
+          </p:cNvPr>
+          <p:cNvPicPr>
+            <a:picLocks noChangeAspect="1" noChangeArrowheads="1"/>
+          </p:cNvPicPr>
+          <p:nvPr/>
+        </p:nvPicPr>
+        <p:blipFill>
+          <a:blip r:embed="rId2">
+            <a:extLst>
+              <a:ext uri="{28A0092B-C50C-407E-A947-70E740481C1C}">
+                <a14:useLocalDpi xmlns:a14="http://schemas.microsoft.com/office/drawing/2010/main" val="0"/>
+              </a:ext>
+            </a:extLst>
+          </a:blip>
+          <a:srcRect/>
+          <a:stretch>
+            <a:fillRect/>
+          </a:stretch>
+        </p:blipFill>
+        <p:spPr bwMode="auto">
+          <a:xfrm>
+            <a:off x="4725404" y="2221992"/>
+            <a:ext cx="5605712" cy="4439724"/>
+          </a:xfrm>
+          <a:prstGeom prst="rect">
+            <a:avLst/>
+          </a:prstGeom>
+          <a:noFill/>
+          <a:extLst>
+            <a:ext uri="{909E8E84-426E-40DD-AFC4-6F175D3DCCD1}">
+              <a14:hiddenFill xmlns:a14="http://schemas.microsoft.com/office/drawing/2010/main">
+                <a:solidFill>
+                  <a:srgbClr val="FFFFFF"/>
+                </a:solidFill>
+              </a14:hiddenFill>
+            </a:ext>
+          </a:extLst>
+        </p:spPr>
+      </p:pic>
     </p:spTree>
     <p:extLst>
       <p:ext uri="{BB962C8B-B14F-4D97-AF65-F5344CB8AC3E}">
-        <p14:creationId xmlns:p14="http://schemas.microsoft.com/office/powerpoint/2010/main" val="2242488321"/>
+        <p14:creationId xmlns:p14="http://schemas.microsoft.com/office/powerpoint/2010/main" val="2910650583"/>
       </p:ext>
     </p:extLst>
   </p:cSld>
@@ -8277,10 +8243,9 @@
           <a:lstStyle/>
           <a:p>
             <a:r>
-              <a:rPr lang="en-US" dirty="0" smtClean="0"/>
+              <a:rPr lang="en-US" dirty="0"/>
               <a:t>Development Manual</a:t>
             </a:r>
-            <a:endParaRPr lang="en-US" dirty="0"/>
           </a:p>
         </p:txBody>
       </p:sp>
@@ -8878,10 +8843,9 @@
           <a:lstStyle/>
           <a:p>
             <a:r>
-              <a:rPr lang="en-US" dirty="0" smtClean="0"/>
+              <a:rPr lang="en-US" dirty="0"/>
               <a:t>Traceability Link Matrix</a:t>
             </a:r>
-            <a:endParaRPr lang="en-US" dirty="0"/>
           </a:p>
         </p:txBody>
       </p:sp>
@@ -9038,18 +9002,13 @@
           <a:bodyPr/>
           <a:lstStyle/>
           <a:p>
-            <a:r>
-              <a:rPr lang="en-US" dirty="0" smtClean="0"/>
-              <a:t/>
-            </a:r>
             <a:br>
-              <a:rPr lang="en-US" dirty="0" smtClean="0"/>
+              <a:rPr lang="en-US" dirty="0"/>
             </a:br>
             <a:r>
-              <a:rPr lang="en-US" dirty="0" smtClean="0"/>
+              <a:rPr lang="en-US" dirty="0"/>
               <a:t>Traceability Link Matrix</a:t>
             </a:r>
-            <a:endParaRPr lang="en-US" dirty="0"/>
           </a:p>
         </p:txBody>
       </p:sp>
@@ -9474,7 +9433,7 @@
           <p:cNvPr id="2" name="Title 1">
             <a:extLst>
               <a:ext uri="{FF2B5EF4-FFF2-40B4-BE49-F238E27FC236}">
-                <a16:creationId xmlns:a16="http://schemas.microsoft.com/office/drawing/2014/main" id="{3C62F2BE-55A9-48C7-8B1B-0E04B06EFA46}"/>
+                <a16:creationId xmlns:a16="http://schemas.microsoft.com/office/drawing/2014/main" id="{06231EB0-5BC6-45C3-8E06-97320A05BEC2}"/>
               </a:ext>
             </a:extLst>
           </p:cNvPr>
@@ -9485,123 +9444,74 @@
             <p:ph type="title"/>
           </p:nvPr>
         </p:nvSpPr>
-        <p:spPr>
-          <a:xfrm>
-            <a:off x="0" y="-1926162"/>
-            <a:ext cx="3852070" cy="4601183"/>
-          </a:xfrm>
-        </p:spPr>
+        <p:spPr/>
         <p:txBody>
           <a:bodyPr/>
           <a:lstStyle/>
           <a:p>
             <a:r>
-              <a:rPr lang="en-US" dirty="0">
-                <a:solidFill>
-                  <a:schemeClr val="tx1"/>
-                </a:solidFill>
-              </a:rPr>
-              <a:t>More Information</a:t>
+              <a:rPr lang="en-US" dirty="0"/>
+              <a:t>How did we work?</a:t>
             </a:r>
           </a:p>
         </p:txBody>
       </p:sp>
-      <p:pic>
-        <p:nvPicPr>
-          <p:cNvPr id="4" name="Content Placeholder 3">
+      <p:sp>
+        <p:nvSpPr>
+          <p:cNvPr id="3" name="Content Placeholder 2">
             <a:extLst>
               <a:ext uri="{FF2B5EF4-FFF2-40B4-BE49-F238E27FC236}">
-                <a16:creationId xmlns:a16="http://schemas.microsoft.com/office/drawing/2014/main" id="{0B1E8E55-4C96-4618-94F8-610C732F322A}"/>
+                <a16:creationId xmlns:a16="http://schemas.microsoft.com/office/drawing/2014/main" id="{19A53038-B50A-4D2E-90CB-EC0A7B2E6576}"/>
               </a:ext>
             </a:extLst>
           </p:cNvPr>
-          <p:cNvPicPr>
-            <a:picLocks noGrp="1" noChangeAspect="1"/>
-          </p:cNvPicPr>
+          <p:cNvSpPr>
+            <a:spLocks noGrp="1"/>
+          </p:cNvSpPr>
           <p:nvPr>
             <p:ph idx="1"/>
           </p:nvPr>
-        </p:nvPicPr>
-        <p:blipFill>
-          <a:blip r:embed="rId2"/>
-          <a:stretch>
-            <a:fillRect/>
-          </a:stretch>
-        </p:blipFill>
-        <p:spPr>
-          <a:xfrm>
-            <a:off x="272716" y="623376"/>
-            <a:ext cx="5197642" cy="5611248"/>
-          </a:xfrm>
-          <a:prstGeom prst="rect">
-            <a:avLst/>
-          </a:prstGeom>
-        </p:spPr>
-      </p:pic>
-      <p:pic>
-        <p:nvPicPr>
-          <p:cNvPr id="6" name="Picture 5">
-            <a:extLst>
-              <a:ext uri="{FF2B5EF4-FFF2-40B4-BE49-F238E27FC236}">
-                <a16:creationId xmlns:a16="http://schemas.microsoft.com/office/drawing/2014/main" id="{E3C66CA6-94F0-4ECA-AE05-30DE8A1C1737}"/>
-              </a:ext>
-            </a:extLst>
-          </p:cNvPr>
-          <p:cNvPicPr>
-            <a:picLocks noChangeAspect="1"/>
-          </p:cNvPicPr>
-          <p:nvPr/>
-        </p:nvPicPr>
-        <p:blipFill>
-          <a:blip r:embed="rId3"/>
-          <a:stretch>
-            <a:fillRect/>
-          </a:stretch>
-        </p:blipFill>
-        <p:spPr>
-          <a:xfrm>
-            <a:off x="5743074" y="1768662"/>
-            <a:ext cx="6007092" cy="4465962"/>
-          </a:xfrm>
-          <a:prstGeom prst="rect">
-            <a:avLst/>
-          </a:prstGeom>
-        </p:spPr>
-      </p:pic>
-      <p:pic>
-        <p:nvPicPr>
-          <p:cNvPr id="7" name="Picture 6">
-            <a:extLst>
-              <a:ext uri="{FF2B5EF4-FFF2-40B4-BE49-F238E27FC236}">
-                <a16:creationId xmlns:a16="http://schemas.microsoft.com/office/drawing/2014/main" id="{C877D75A-470D-442E-87C6-9DAC3C50D888}"/>
-              </a:ext>
-            </a:extLst>
-          </p:cNvPr>
-          <p:cNvPicPr>
-            <a:picLocks noChangeAspect="1"/>
-          </p:cNvPicPr>
-          <p:nvPr/>
-        </p:nvPicPr>
-        <p:blipFill>
-          <a:blip r:embed="rId4"/>
-          <a:stretch>
-            <a:fillRect/>
-          </a:stretch>
-        </p:blipFill>
-        <p:spPr>
-          <a:xfrm>
-            <a:off x="6368716" y="246092"/>
-            <a:ext cx="2919663" cy="2001625"/>
-          </a:xfrm>
-          <a:prstGeom prst="rect">
-            <a:avLst/>
-          </a:prstGeom>
-        </p:spPr>
-      </p:pic>
+        </p:nvSpPr>
+        <p:spPr/>
+        <p:txBody>
+          <a:bodyPr>
+            <a:normAutofit/>
+          </a:bodyPr>
+          <a:lstStyle/>
+          <a:p>
+            <a:r>
+              <a:rPr lang="en-US" sz="3200" dirty="0"/>
+              <a:t>We had regular weekly meetings.</a:t>
+            </a:r>
+          </a:p>
+          <a:p>
+            <a:pPr lvl="1"/>
+            <a:r>
+              <a:rPr lang="en-US" sz="3000" dirty="0"/>
+              <a:t>Usually on Sundays.</a:t>
+            </a:r>
+          </a:p>
+          <a:p>
+            <a:r>
+              <a:rPr lang="en-US" sz="3200" dirty="0"/>
+              <a:t>We communicated consistently, mostly via text.</a:t>
+            </a:r>
+          </a:p>
+          <a:p>
+            <a:r>
+              <a:rPr lang="en-US" sz="3200" dirty="0"/>
+              <a:t>We broke up work to be done as Issues on GitHub.</a:t>
+            </a:r>
+          </a:p>
+          <a:p>
+            <a:endParaRPr lang="en-US" sz="3200" dirty="0"/>
+          </a:p>
+        </p:txBody>
+      </p:sp>
     </p:spTree>
     <p:extLst>
       <p:ext uri="{BB962C8B-B14F-4D97-AF65-F5344CB8AC3E}">
-        <p14:creationId xmlns:p14="http://schemas.microsoft.com/office/powerpoint/2010/main" val="1915090375"/>
+        <p14:creationId xmlns:p14="http://schemas.microsoft.com/office/powerpoint/2010/main" val="2242488321"/>
       </p:ext>
     </p:extLst>
   </p:cSld>
@@ -9633,7 +9543,7 @@
           <p:cNvPr id="2" name="Title 1">
             <a:extLst>
               <a:ext uri="{FF2B5EF4-FFF2-40B4-BE49-F238E27FC236}">
-                <a16:creationId xmlns:a16="http://schemas.microsoft.com/office/drawing/2014/main" id="{7089F230-807D-42B9-86FD-FC73B5CDC0B9}"/>
+                <a16:creationId xmlns:a16="http://schemas.microsoft.com/office/drawing/2014/main" id="{3C62F2BE-55A9-48C7-8B1B-0E04B06EFA46}"/>
               </a:ext>
             </a:extLst>
           </p:cNvPr>
@@ -9644,38 +9554,10 @@
             <p:ph type="title"/>
           </p:nvPr>
         </p:nvSpPr>
-        <p:spPr/>
-        <p:txBody>
-          <a:bodyPr/>
-          <a:lstStyle/>
-          <a:p>
-            <a:r>
-              <a:rPr lang="en-US" dirty="0"/>
-              <a:t>Banqi</a:t>
-            </a:r>
-          </a:p>
-        </p:txBody>
-      </p:sp>
-      <p:sp>
-        <p:nvSpPr>
-          <p:cNvPr id="3" name="Content Placeholder 2">
-            <a:extLst>
-              <a:ext uri="{FF2B5EF4-FFF2-40B4-BE49-F238E27FC236}">
-                <a16:creationId xmlns:a16="http://schemas.microsoft.com/office/drawing/2014/main" id="{375C385B-8D63-4668-A8C5-F7321A65FF93}"/>
-              </a:ext>
-            </a:extLst>
-          </p:cNvPr>
-          <p:cNvSpPr>
-            <a:spLocks noGrp="1"/>
-          </p:cNvSpPr>
-          <p:nvPr>
-            <p:ph idx="1"/>
-          </p:nvPr>
-        </p:nvSpPr>
         <p:spPr>
           <a:xfrm>
-            <a:off x="3869268" y="246647"/>
-            <a:ext cx="7315200" cy="1975345"/>
+            <a:off x="0" y="-1926162"/>
+            <a:ext cx="9372600" cy="4601183"/>
           </a:xfrm>
         </p:spPr>
         <p:txBody>
@@ -9683,70 +9565,139 @@
           <a:lstStyle/>
           <a:p>
             <a:r>
-              <a:rPr lang="en-US" dirty="0"/>
-              <a:t>Description of Banqi</a:t>
-            </a:r>
-          </a:p>
-          <a:p>
-            <a:pPr lvl="1"/>
-            <a:r>
-              <a:rPr lang="en-US" dirty="0"/>
-              <a:t>Half/Blind Chinese Chess – game consists of tokens with various power levels, each placed face-down on the board in a random position. Tokens must be flipped face up (revealing color/power level) before you can move them – higher power level tokens can take lower power level tokens. Soldier can take General, General cannot take Soldier, Cannon can take anything (by jumping).</a:t>
+              <a:rPr lang="en-US" dirty="0">
+                <a:solidFill>
+                  <a:schemeClr val="tx1"/>
+                </a:solidFill>
+              </a:rPr>
+              <a:t>More Information…</a:t>
             </a:r>
           </a:p>
         </p:txBody>
       </p:sp>
       <p:pic>
         <p:nvPicPr>
-          <p:cNvPr id="1028" name="Picture 4" descr="Image result for banqi">
+          <p:cNvPr id="3" name="Picture 2">
             <a:extLst>
               <a:ext uri="{FF2B5EF4-FFF2-40B4-BE49-F238E27FC236}">
-                <a16:creationId xmlns:a16="http://schemas.microsoft.com/office/drawing/2014/main" id="{37223C20-ED66-405B-906C-E8592E416393}"/>
+                <a16:creationId xmlns:a16="http://schemas.microsoft.com/office/drawing/2014/main" id="{51A5F1C4-A882-408C-A8AB-720E6D83B96D}"/>
               </a:ext>
             </a:extLst>
           </p:cNvPr>
           <p:cNvPicPr>
-            <a:picLocks noChangeAspect="1" noChangeArrowheads="1"/>
+            <a:picLocks noChangeAspect="1"/>
           </p:cNvPicPr>
           <p:nvPr/>
         </p:nvPicPr>
         <p:blipFill>
-          <a:blip r:embed="rId2">
-            <a:extLst>
-              <a:ext uri="{28A0092B-C50C-407E-A947-70E740481C1C}">
-                <a14:useLocalDpi xmlns:a14="http://schemas.microsoft.com/office/drawing/2010/main" val="0"/>
-              </a:ext>
-            </a:extLst>
-          </a:blip>
-          <a:srcRect/>
+          <a:blip r:embed="rId2"/>
           <a:stretch>
             <a:fillRect/>
           </a:stretch>
         </p:blipFill>
-        <p:spPr bwMode="auto">
+        <p:spPr>
           <a:xfrm>
-            <a:off x="4725404" y="2221992"/>
-            <a:ext cx="5605712" cy="4439724"/>
+            <a:off x="5873749" y="444638"/>
+            <a:ext cx="5085676" cy="3631641"/>
           </a:xfrm>
           <a:prstGeom prst="rect">
             <a:avLst/>
           </a:prstGeom>
-          <a:noFill/>
-          <a:extLst>
-            <a:ext uri="{909E8E84-426E-40DD-AFC4-6F175D3DCCD1}">
-              <a14:hiddenFill xmlns:a14="http://schemas.microsoft.com/office/drawing/2010/main">
-                <a:solidFill>
-                  <a:srgbClr val="FFFFFF"/>
-                </a:solidFill>
-              </a14:hiddenFill>
-            </a:ext>
-          </a:extLst>
+        </p:spPr>
+      </p:pic>
+      <p:pic>
+        <p:nvPicPr>
+          <p:cNvPr id="9" name="Picture 8">
+            <a:extLst>
+              <a:ext uri="{FF2B5EF4-FFF2-40B4-BE49-F238E27FC236}">
+                <a16:creationId xmlns:a16="http://schemas.microsoft.com/office/drawing/2014/main" id="{1F9F9E75-7F24-4FFB-B09E-32B90BC583FC}"/>
+              </a:ext>
+            </a:extLst>
+          </p:cNvPr>
+          <p:cNvPicPr>
+            <a:picLocks noChangeAspect="1"/>
+          </p:cNvPicPr>
+          <p:nvPr/>
+        </p:nvPicPr>
+        <p:blipFill>
+          <a:blip r:embed="rId3"/>
+          <a:stretch>
+            <a:fillRect/>
+          </a:stretch>
+        </p:blipFill>
+        <p:spPr>
+          <a:xfrm>
+            <a:off x="294853" y="753533"/>
+            <a:ext cx="4948954" cy="5350933"/>
+          </a:xfrm>
+          <a:prstGeom prst="rect">
+            <a:avLst/>
+          </a:prstGeom>
+        </p:spPr>
+      </p:pic>
+      <p:pic>
+        <p:nvPicPr>
+          <p:cNvPr id="10" name="Picture 9">
+            <a:extLst>
+              <a:ext uri="{FF2B5EF4-FFF2-40B4-BE49-F238E27FC236}">
+                <a16:creationId xmlns:a16="http://schemas.microsoft.com/office/drawing/2014/main" id="{734DBE94-A5E0-46D0-AAE5-9B620F464265}"/>
+              </a:ext>
+            </a:extLst>
+          </p:cNvPr>
+          <p:cNvPicPr>
+            <a:picLocks noChangeAspect="1"/>
+          </p:cNvPicPr>
+          <p:nvPr/>
+        </p:nvPicPr>
+        <p:blipFill>
+          <a:blip r:embed="rId4"/>
+          <a:stretch>
+            <a:fillRect/>
+          </a:stretch>
+        </p:blipFill>
+        <p:spPr>
+          <a:xfrm>
+            <a:off x="8976820" y="4954507"/>
+            <a:ext cx="2475825" cy="1552574"/>
+          </a:xfrm>
+          <a:prstGeom prst="rect">
+            <a:avLst/>
+          </a:prstGeom>
+        </p:spPr>
+      </p:pic>
+      <p:pic>
+        <p:nvPicPr>
+          <p:cNvPr id="11" name="Picture 10">
+            <a:extLst>
+              <a:ext uri="{FF2B5EF4-FFF2-40B4-BE49-F238E27FC236}">
+                <a16:creationId xmlns:a16="http://schemas.microsoft.com/office/drawing/2014/main" id="{B7AA65DF-5198-481B-BC28-7CBC85822477}"/>
+              </a:ext>
+            </a:extLst>
+          </p:cNvPr>
+          <p:cNvPicPr>
+            <a:picLocks noChangeAspect="1"/>
+          </p:cNvPicPr>
+          <p:nvPr/>
+        </p:nvPicPr>
+        <p:blipFill rotWithShape="1">
+          <a:blip r:embed="rId5"/>
+          <a:srcRect r="26218"/>
+          <a:stretch/>
+        </p:blipFill>
+        <p:spPr>
+          <a:xfrm>
+            <a:off x="3134782" y="4954506"/>
+            <a:ext cx="5477934" cy="1552575"/>
+          </a:xfrm>
+          <a:prstGeom prst="rect">
+            <a:avLst/>
+          </a:prstGeom>
         </p:spPr>
       </p:pic>
     </p:spTree>
     <p:extLst>
       <p:ext uri="{BB962C8B-B14F-4D97-AF65-F5344CB8AC3E}">
-        <p14:creationId xmlns:p14="http://schemas.microsoft.com/office/powerpoint/2010/main" val="2910650583"/>
+        <p14:creationId xmlns:p14="http://schemas.microsoft.com/office/powerpoint/2010/main" val="1915090375"/>
       </p:ext>
     </p:extLst>
   </p:cSld>
@@ -9801,10 +9752,6 @@
             <a:br>
               <a:rPr lang="en-US" dirty="0"/>
             </a:br>
-            <a:r>
-              <a:rPr lang="en-US" dirty="0"/>
-              <a:t/>
-            </a:r>
             <a:br>
               <a:rPr lang="en-US" dirty="0"/>
             </a:br>
@@ -9834,7 +9781,7 @@
         <p:spPr/>
         <p:txBody>
           <a:bodyPr>
-            <a:normAutofit/>
+            <a:normAutofit lnSpcReduction="10000"/>
           </a:bodyPr>
           <a:lstStyle/>
           <a:p>
@@ -9888,6 +9835,12 @@
           <a:p>
             <a:r>
               <a:rPr lang="en-US" dirty="0"/>
+              <a:t>#90 – Implemented Recommended Changes to Code (Max)</a:t>
+            </a:r>
+          </a:p>
+          <a:p>
+            <a:r>
+              <a:rPr lang="en-US" dirty="0"/>
               <a:t>#91 – Implement Forfeit Game, Database Side (Spencer)</a:t>
             </a:r>
           </a:p>
@@ -9901,6 +9854,12 @@
             <a:r>
               <a:rPr lang="en-US" dirty="0"/>
               <a:t>#95 – Fix Graveyard Issue (Nicholas, Max)</a:t>
+            </a:r>
+          </a:p>
+          <a:p>
+            <a:r>
+              <a:rPr lang="en-US" dirty="0"/>
+              <a:t>#106 – Implement AI (Max, Nicholas &amp; Tyler)</a:t>
             </a:r>
           </a:p>
         </p:txBody>
@@ -10146,10 +10105,6 @@
             <a:br>
               <a:rPr lang="en-US" dirty="0"/>
             </a:br>
-            <a:r>
-              <a:rPr lang="en-US" dirty="0"/>
-              <a:t/>
-            </a:r>
             <a:br>
               <a:rPr lang="en-US" dirty="0"/>
             </a:br>
@@ -10160,10 +10115,6 @@
             <a:br>
               <a:rPr lang="en-US" dirty="0"/>
             </a:br>
-            <a:r>
-              <a:rPr lang="en-US" dirty="0"/>
-              <a:t/>
-            </a:r>
             <a:br>
               <a:rPr lang="en-US" dirty="0"/>
             </a:br>
@@ -10267,10 +10218,6 @@
             <a:br>
               <a:rPr lang="en-US" dirty="0"/>
             </a:br>
-            <a:r>
-              <a:rPr lang="en-US" dirty="0"/>
-              <a:t/>
-            </a:r>
             <a:br>
               <a:rPr lang="en-US" dirty="0"/>
             </a:br>
@@ -10281,10 +10228,6 @@
             <a:br>
               <a:rPr lang="en-US" dirty="0"/>
             </a:br>
-            <a:r>
-              <a:rPr lang="en-US" dirty="0"/>
-              <a:t/>
-            </a:r>
             <a:br>
               <a:rPr lang="en-US" dirty="0"/>
             </a:br>

</xml_diff>

<commit_message>
domain model fixed for AI
</commit_message>
<xml_diff>
--- a/Presentation 5/Presentation.pptx
+++ b/Presentation 5/Presentation.pptx
@@ -10017,10 +10017,10 @@
       </p:sp>
       <p:pic>
         <p:nvPicPr>
-          <p:cNvPr id="7" name="Content Placeholder 6">
+          <p:cNvPr id="6" name="Content Placeholder 5">
             <a:extLst>
               <a:ext uri="{FF2B5EF4-FFF2-40B4-BE49-F238E27FC236}">
-                <a16:creationId xmlns:a16="http://schemas.microsoft.com/office/drawing/2014/main" id="{2B87D84E-D462-4237-879D-CF2C4931398C}"/>
+                <a16:creationId xmlns:a16="http://schemas.microsoft.com/office/drawing/2014/main" id="{C168C6AC-7302-4B06-888C-1ADA7C2EA10A}"/>
               </a:ext>
             </a:extLst>
           </p:cNvPr>
@@ -10032,19 +10032,22 @@
           </p:nvPr>
         </p:nvPicPr>
         <p:blipFill>
-          <a:blip r:embed="rId2"/>
+          <a:blip r:embed="rId2">
+            <a:extLst>
+              <a:ext uri="{28A0092B-C50C-407E-A947-70E740481C1C}">
+                <a14:useLocalDpi xmlns:a14="http://schemas.microsoft.com/office/drawing/2010/main" val="0"/>
+              </a:ext>
+            </a:extLst>
+          </a:blip>
           <a:stretch>
             <a:fillRect/>
           </a:stretch>
         </p:blipFill>
         <p:spPr>
           <a:xfrm>
-            <a:off x="3868738" y="1147568"/>
-            <a:ext cx="7315200" cy="4553338"/>
+            <a:off x="3868738" y="1135613"/>
+            <a:ext cx="7315200" cy="4577249"/>
           </a:xfrm>
-          <a:prstGeom prst="rect">
-            <a:avLst/>
-          </a:prstGeom>
         </p:spPr>
       </p:pic>
     </p:spTree>

</xml_diff>